<commit_message>
Se agrega adelantos a los docs
</commit_message>
<xml_diff>
--- a/docs/Plantilla Presentación para vídeo Final.pptx
+++ b/docs/Plantilla Presentación para vídeo Final.pptx
@@ -266,7 +266,7 @@
           <a:p>
             <a:fld id="{751C8DE2-A473-4E25-B814-7B29503CC0E0}" type="datetimeFigureOut">
               <a:rPr lang="es-CO" smtClean="0"/>
-              <a:t>19/08/2021</a:t>
+              <a:t>23/08/2021</a:t>
             </a:fld>
             <a:endParaRPr lang="es-CO"/>
           </a:p>
@@ -466,7 +466,7 @@
           <a:p>
             <a:fld id="{751C8DE2-A473-4E25-B814-7B29503CC0E0}" type="datetimeFigureOut">
               <a:rPr lang="es-CO" smtClean="0"/>
-              <a:t>19/08/2021</a:t>
+              <a:t>23/08/2021</a:t>
             </a:fld>
             <a:endParaRPr lang="es-CO"/>
           </a:p>
@@ -676,7 +676,7 @@
           <a:p>
             <a:fld id="{751C8DE2-A473-4E25-B814-7B29503CC0E0}" type="datetimeFigureOut">
               <a:rPr lang="es-CO" smtClean="0"/>
-              <a:t>19/08/2021</a:t>
+              <a:t>23/08/2021</a:t>
             </a:fld>
             <a:endParaRPr lang="es-CO"/>
           </a:p>
@@ -876,7 +876,7 @@
           <a:p>
             <a:fld id="{751C8DE2-A473-4E25-B814-7B29503CC0E0}" type="datetimeFigureOut">
               <a:rPr lang="es-CO" smtClean="0"/>
-              <a:t>19/08/2021</a:t>
+              <a:t>23/08/2021</a:t>
             </a:fld>
             <a:endParaRPr lang="es-CO"/>
           </a:p>
@@ -1152,7 +1152,7 @@
           <a:p>
             <a:fld id="{751C8DE2-A473-4E25-B814-7B29503CC0E0}" type="datetimeFigureOut">
               <a:rPr lang="es-CO" smtClean="0"/>
-              <a:t>19/08/2021</a:t>
+              <a:t>23/08/2021</a:t>
             </a:fld>
             <a:endParaRPr lang="es-CO"/>
           </a:p>
@@ -1420,7 +1420,7 @@
           <a:p>
             <a:fld id="{751C8DE2-A473-4E25-B814-7B29503CC0E0}" type="datetimeFigureOut">
               <a:rPr lang="es-CO" smtClean="0"/>
-              <a:t>19/08/2021</a:t>
+              <a:t>23/08/2021</a:t>
             </a:fld>
             <a:endParaRPr lang="es-CO"/>
           </a:p>
@@ -1835,7 +1835,7 @@
           <a:p>
             <a:fld id="{751C8DE2-A473-4E25-B814-7B29503CC0E0}" type="datetimeFigureOut">
               <a:rPr lang="es-CO" smtClean="0"/>
-              <a:t>19/08/2021</a:t>
+              <a:t>23/08/2021</a:t>
             </a:fld>
             <a:endParaRPr lang="es-CO"/>
           </a:p>
@@ -1977,7 +1977,7 @@
           <a:p>
             <a:fld id="{751C8DE2-A473-4E25-B814-7B29503CC0E0}" type="datetimeFigureOut">
               <a:rPr lang="es-CO" smtClean="0"/>
-              <a:t>19/08/2021</a:t>
+              <a:t>23/08/2021</a:t>
             </a:fld>
             <a:endParaRPr lang="es-CO"/>
           </a:p>
@@ -2090,7 +2090,7 @@
           <a:p>
             <a:fld id="{751C8DE2-A473-4E25-B814-7B29503CC0E0}" type="datetimeFigureOut">
               <a:rPr lang="es-CO" smtClean="0"/>
-              <a:t>19/08/2021</a:t>
+              <a:t>23/08/2021</a:t>
             </a:fld>
             <a:endParaRPr lang="es-CO"/>
           </a:p>
@@ -2403,7 +2403,7 @@
           <a:p>
             <a:fld id="{751C8DE2-A473-4E25-B814-7B29503CC0E0}" type="datetimeFigureOut">
               <a:rPr lang="es-CO" smtClean="0"/>
-              <a:t>19/08/2021</a:t>
+              <a:t>23/08/2021</a:t>
             </a:fld>
             <a:endParaRPr lang="es-CO"/>
           </a:p>
@@ -2692,7 +2692,7 @@
           <a:p>
             <a:fld id="{751C8DE2-A473-4E25-B814-7B29503CC0E0}" type="datetimeFigureOut">
               <a:rPr lang="es-CO" smtClean="0"/>
-              <a:t>19/08/2021</a:t>
+              <a:t>23/08/2021</a:t>
             </a:fld>
             <a:endParaRPr lang="es-CO"/>
           </a:p>
@@ -2935,7 +2935,7 @@
           <a:p>
             <a:fld id="{751C8DE2-A473-4E25-B814-7B29503CC0E0}" type="datetimeFigureOut">
               <a:rPr lang="es-CO" smtClean="0"/>
-              <a:t>19/08/2021</a:t>
+              <a:t>23/08/2021</a:t>
             </a:fld>
             <a:endParaRPr lang="es-CO"/>
           </a:p>
@@ -3401,7 +3401,16 @@
                 </a:solidFill>
                 <a:latin typeface="Ancizar Sans" panose="020B0602040300000003" pitchFamily="34" charset="0"/>
               </a:rPr>
-              <a:t>Estudiantes del programa de Ingeniería de Sistemas y Computación</a:t>
+              <a:t>Estudiantes del programa de Ingeniería de Sistemas y Computación y </a:t>
+            </a:r>
+            <a:r>
+              <a:rPr lang="es-MX" sz="2400" b="1" i="1" dirty="0" err="1">
+                <a:solidFill>
+                  <a:schemeClr val="bg1"/>
+                </a:solidFill>
+                <a:latin typeface="Ancizar Sans" panose="020B0602040300000003" pitchFamily="34" charset="0"/>
+              </a:rPr>
+              <a:t>Mecatronica</a:t>
             </a:r>
             <a:endParaRPr lang="es-CO" sz="2400" b="1" i="1" dirty="0">
               <a:solidFill>
@@ -3554,58 +3563,6 @@
       </p:sp>
       <p:sp>
         <p:nvSpPr>
-          <p:cNvPr id="18" name="Elipse 17">
-            <a:extLst>
-              <a:ext uri="{FF2B5EF4-FFF2-40B4-BE49-F238E27FC236}">
-                <a16:creationId xmlns:a16="http://schemas.microsoft.com/office/drawing/2014/main" id="{F232E3A2-DD9C-4C2D-9D13-FC93C9C87D8E}"/>
-              </a:ext>
-            </a:extLst>
-          </p:cNvPr>
-          <p:cNvSpPr/>
-          <p:nvPr/>
-        </p:nvSpPr>
-        <p:spPr>
-          <a:xfrm>
-            <a:off x="6788732" y="3555355"/>
-            <a:ext cx="928914" cy="928914"/>
-          </a:xfrm>
-          <a:prstGeom prst="ellipse">
-            <a:avLst/>
-          </a:prstGeom>
-          <a:solidFill>
-            <a:schemeClr val="bg1"/>
-          </a:solidFill>
-          <a:ln>
-            <a:noFill/>
-          </a:ln>
-        </p:spPr>
-        <p:style>
-          <a:lnRef idx="2">
-            <a:schemeClr val="accent1">
-              <a:shade val="50000"/>
-            </a:schemeClr>
-          </a:lnRef>
-          <a:fillRef idx="1">
-            <a:schemeClr val="accent1"/>
-          </a:fillRef>
-          <a:effectRef idx="0">
-            <a:schemeClr val="accent1"/>
-          </a:effectRef>
-          <a:fontRef idx="minor">
-            <a:schemeClr val="lt1"/>
-          </a:fontRef>
-        </p:style>
-        <p:txBody>
-          <a:bodyPr rtlCol="0" anchor="ctr"/>
-          <a:lstStyle/>
-          <a:p>
-            <a:pPr algn="ctr"/>
-            <a:endParaRPr lang="es-CO" dirty="0"/>
-          </a:p>
-        </p:txBody>
-      </p:sp>
-      <p:sp>
-        <p:nvSpPr>
           <p:cNvPr id="19" name="CuadroTexto 18">
             <a:extLst>
               <a:ext uri="{FF2B5EF4-FFF2-40B4-BE49-F238E27FC236}">
@@ -3690,23 +3647,8 @@
                 </a:solidFill>
                 <a:latin typeface="Ancizar Sans" panose="020B0602040300000003" pitchFamily="34" charset="0"/>
               </a:rPr>
-              <a:t>Luis Fernando Niño </a:t>
-            </a:r>
-            <a:r>
-              <a:rPr lang="es-MX" sz="1400" b="1" i="1" dirty="0" err="1">
-                <a:solidFill>
-                  <a:schemeClr val="bg1"/>
-                </a:solidFill>
-                <a:latin typeface="Ancizar Sans" panose="020B0602040300000003" pitchFamily="34" charset="0"/>
-              </a:rPr>
-              <a:t>Vasquez</a:t>
-            </a:r>
-            <a:endParaRPr lang="es-MX" sz="1400" b="1" i="1" dirty="0">
-              <a:solidFill>
-                <a:schemeClr val="bg1"/>
-              </a:solidFill>
-              <a:latin typeface="Ancizar Sans" panose="020B0602040300000003" pitchFamily="34" charset="0"/>
-            </a:endParaRPr>
+              <a:t>Luis Fernando Niño Vasquez</a:t>
+            </a:r>
           </a:p>
           <a:p>
             <a:r>
@@ -3729,6 +3671,65 @@
           </a:p>
         </p:txBody>
       </p:sp>
+      <p:pic>
+        <p:nvPicPr>
+          <p:cNvPr id="10" name="Imagen 9" descr="Una persona con una camisa azul&#10;&#10;Descripción generada automáticamente">
+            <a:extLst>
+              <a:ext uri="{FF2B5EF4-FFF2-40B4-BE49-F238E27FC236}">
+                <a16:creationId xmlns:a16="http://schemas.microsoft.com/office/drawing/2014/main" id="{B9311B65-036F-40C2-8238-8FE5F792D286}"/>
+              </a:ext>
+            </a:extLst>
+          </p:cNvPr>
+          <p:cNvPicPr>
+            <a:picLocks noChangeAspect="1"/>
+          </p:cNvPicPr>
+          <p:nvPr/>
+        </p:nvPicPr>
+        <p:blipFill rotWithShape="1">
+          <a:blip r:embed="rId4">
+            <a:extLst>
+              <a:ext uri="{28A0092B-C50C-407E-A947-70E740481C1C}">
+                <a14:useLocalDpi xmlns:a14="http://schemas.microsoft.com/office/drawing/2010/main" val="0"/>
+              </a:ext>
+            </a:extLst>
+          </a:blip>
+          <a:srcRect t="-806"/>
+          <a:stretch/>
+        </p:blipFill>
+        <p:spPr>
+          <a:xfrm>
+            <a:off x="6759266" y="3573893"/>
+            <a:ext cx="926453" cy="871353"/>
+          </a:xfrm>
+          <a:prstGeom prst="ellipse">
+            <a:avLst/>
+          </a:prstGeom>
+          <a:ln w="63500" cap="rnd">
+            <a:solidFill>
+              <a:srgbClr val="333333"/>
+            </a:solidFill>
+          </a:ln>
+          <a:effectLst>
+            <a:outerShdw blurRad="381000" dist="292100" dir="5400000" sx="-80000" sy="-18000" rotWithShape="0">
+              <a:srgbClr val="000000">
+                <a:alpha val="22000"/>
+              </a:srgbClr>
+            </a:outerShdw>
+          </a:effectLst>
+          <a:scene3d>
+            <a:camera prst="orthographicFront"/>
+            <a:lightRig rig="contrasting" dir="t">
+              <a:rot lat="0" lon="0" rev="3000000"/>
+            </a:lightRig>
+          </a:scene3d>
+          <a:sp3d contourW="7620">
+            <a:bevelT w="95250" h="31750"/>
+            <a:contourClr>
+              <a:srgbClr val="333333"/>
+            </a:contourClr>
+          </a:sp3d>
+        </p:spPr>
+      </p:pic>
     </p:spTree>
     <p:extLst>
       <p:ext uri="{BB962C8B-B14F-4D97-AF65-F5344CB8AC3E}">
@@ -3869,13 +3870,13 @@
   <p:clrMapOvr>
     <a:masterClrMapping/>
   </p:clrMapOvr>
-  <mc:AlternateContent xmlns:mc="http://schemas.openxmlformats.org/markup-compatibility/2006">
-    <mc:Choice xmlns:p15="http://schemas.microsoft.com/office/powerpoint/2012/main" Requires="p15">
+  <mc:AlternateContent xmlns:mc="http://schemas.openxmlformats.org/markup-compatibility/2006" xmlns:p15="http://schemas.microsoft.com/office/powerpoint/2012/main">
+    <mc:Choice Requires="p15">
       <p:transition xmlns:p14="http://schemas.microsoft.com/office/powerpoint/2010/main" spd="slow" p14:dur="2000">
         <p15:prstTrans prst="fracture"/>
       </p:transition>
     </mc:Choice>
-    <mc:Fallback>
+    <mc:Fallback xmlns="">
       <p:transition spd="slow">
         <p:fade/>
       </p:transition>
@@ -4657,13 +4658,13 @@
   <p:clrMapOvr>
     <a:masterClrMapping/>
   </p:clrMapOvr>
-  <mc:AlternateContent xmlns:mc="http://schemas.openxmlformats.org/markup-compatibility/2006">
-    <mc:Choice xmlns:p15="http://schemas.microsoft.com/office/powerpoint/2012/main" Requires="p15">
+  <mc:AlternateContent xmlns:mc="http://schemas.openxmlformats.org/markup-compatibility/2006" xmlns:p15="http://schemas.microsoft.com/office/powerpoint/2012/main">
+    <mc:Choice Requires="p15">
       <p:transition xmlns:p14="http://schemas.microsoft.com/office/powerpoint/2010/main" spd="slow" p14:dur="2000">
         <p15:prstTrans prst="fallOver"/>
       </p:transition>
     </mc:Choice>
-    <mc:Fallback>
+    <mc:Fallback xmlns="">
       <p:transition spd="slow">
         <p:fade/>
       </p:transition>
@@ -7208,13 +7209,13 @@
   <p:clrMapOvr>
     <a:masterClrMapping/>
   </p:clrMapOvr>
-  <mc:AlternateContent xmlns:mc="http://schemas.openxmlformats.org/markup-compatibility/2006">
-    <mc:Choice xmlns:p15="http://schemas.microsoft.com/office/powerpoint/2012/main" Requires="p15">
+  <mc:AlternateContent xmlns:mc="http://schemas.openxmlformats.org/markup-compatibility/2006" xmlns:p15="http://schemas.microsoft.com/office/powerpoint/2012/main">
+    <mc:Choice Requires="p15">
       <p:transition xmlns:p14="http://schemas.microsoft.com/office/powerpoint/2010/main" spd="slow" p14:dur="2000">
         <p15:prstTrans prst="crush"/>
       </p:transition>
     </mc:Choice>
-    <mc:Fallback>
+    <mc:Fallback xmlns="">
       <p:transition spd="slow">
         <p:fade/>
       </p:transition>
@@ -7662,13 +7663,13 @@
   <p:clrMapOvr>
     <a:masterClrMapping/>
   </p:clrMapOvr>
-  <mc:AlternateContent xmlns:mc="http://schemas.openxmlformats.org/markup-compatibility/2006">
-    <mc:Choice xmlns:p15="http://schemas.microsoft.com/office/powerpoint/2012/main" Requires="p15">
+  <mc:AlternateContent xmlns:mc="http://schemas.openxmlformats.org/markup-compatibility/2006" xmlns:p15="http://schemas.microsoft.com/office/powerpoint/2012/main">
+    <mc:Choice Requires="p15">
       <p:transition xmlns:p14="http://schemas.microsoft.com/office/powerpoint/2010/main" spd="slow" p14:dur="2000">
         <p15:prstTrans prst="drape"/>
       </p:transition>
     </mc:Choice>
-    <mc:Fallback>
+    <mc:Fallback xmlns="">
       <p:transition spd="slow">
         <p:fade/>
       </p:transition>
@@ -8336,13 +8337,13 @@
   <p:clrMapOvr>
     <a:masterClrMapping/>
   </p:clrMapOvr>
-  <mc:AlternateContent xmlns:mc="http://schemas.openxmlformats.org/markup-compatibility/2006">
-    <mc:Choice xmlns:p15="http://schemas.microsoft.com/office/powerpoint/2012/main" Requires="p15">
+  <mc:AlternateContent xmlns:mc="http://schemas.openxmlformats.org/markup-compatibility/2006" xmlns:p15="http://schemas.microsoft.com/office/powerpoint/2012/main">
+    <mc:Choice Requires="p15">
       <p:transition xmlns:p14="http://schemas.microsoft.com/office/powerpoint/2010/main" spd="slow" p14:dur="2000">
         <p15:prstTrans prst="wind"/>
       </p:transition>
     </mc:Choice>
-    <mc:Fallback>
+    <mc:Fallback xmlns="">
       <p:transition spd="slow">
         <p:fade/>
       </p:transition>

</xml_diff>